<commit_message>
modified before classes and add classes
</commit_message>
<xml_diff>
--- a/72. Handling Different Types of Exception.pptx
+++ b/72. Handling Different Types of Exception.pptx
@@ -109,6 +109,11 @@
       </a:defRPr>
     </a:lvl9pPr>
   </p:defaultTextStyle>
+  <p:extLst>
+    <p:ext uri="{EFAFB233-063F-42B5-8137-9DF3F51BA10A}">
+      <p15:sldGuideLst xmlns:p15="http://schemas.microsoft.com/office/powerpoint/2012/main"/>
+    </p:ext>
+  </p:extLst>
 </p:presentation>
 </file>
 
@@ -154,10 +159,9 @@
           </a:lstStyle>
           <a:p>
             <a:r>
-              <a:rPr lang="en-US" smtClean="0"/>
+              <a:rPr lang="en-US"/>
               <a:t>Click to edit Master title style</a:t>
             </a:r>
-            <a:endParaRPr lang="en-US"/>
           </a:p>
         </p:txBody>
       </p:sp>
@@ -219,10 +223,9 @@
           </a:lstStyle>
           <a:p>
             <a:r>
-              <a:rPr lang="en-US" smtClean="0"/>
+              <a:rPr lang="en-US"/>
               <a:t>Click to edit Master subtitle style</a:t>
             </a:r>
-            <a:endParaRPr lang="en-US"/>
           </a:p>
         </p:txBody>
       </p:sp>
@@ -243,7 +246,7 @@
           <a:p>
             <a:fld id="{D8FB1B42-E81F-421F-9200-BB216B6B8970}" type="datetimeFigureOut">
               <a:rPr lang="en-US" smtClean="0"/>
-              <a:t>1/19/2019</a:t>
+              <a:t>1/26/2019</a:t>
             </a:fld>
             <a:endParaRPr lang="en-US"/>
           </a:p>
@@ -337,10 +340,9 @@
           <a:lstStyle/>
           <a:p>
             <a:r>
-              <a:rPr lang="en-US" smtClean="0"/>
+              <a:rPr lang="en-US"/>
               <a:t>Click to edit Master title style</a:t>
             </a:r>
-            <a:endParaRPr lang="en-US"/>
           </a:p>
         </p:txBody>
       </p:sp>
@@ -361,38 +363,37 @@
           <a:p>
             <a:pPr lvl="0"/>
             <a:r>
-              <a:rPr lang="en-US" smtClean="0"/>
+              <a:rPr lang="en-US"/>
               <a:t>Edit Master text styles</a:t>
             </a:r>
           </a:p>
           <a:p>
             <a:pPr lvl="1"/>
             <a:r>
-              <a:rPr lang="en-US" smtClean="0"/>
+              <a:rPr lang="en-US"/>
               <a:t>Second level</a:t>
             </a:r>
           </a:p>
           <a:p>
             <a:pPr lvl="2"/>
             <a:r>
-              <a:rPr lang="en-US" smtClean="0"/>
+              <a:rPr lang="en-US"/>
               <a:t>Third level</a:t>
             </a:r>
           </a:p>
           <a:p>
             <a:pPr lvl="3"/>
             <a:r>
-              <a:rPr lang="en-US" smtClean="0"/>
+              <a:rPr lang="en-US"/>
               <a:t>Fourth level</a:t>
             </a:r>
           </a:p>
           <a:p>
             <a:pPr lvl="4"/>
             <a:r>
-              <a:rPr lang="en-US" smtClean="0"/>
+              <a:rPr lang="en-US"/>
               <a:t>Fifth level</a:t>
             </a:r>
-            <a:endParaRPr lang="en-US"/>
           </a:p>
         </p:txBody>
       </p:sp>
@@ -413,7 +414,7 @@
           <a:p>
             <a:fld id="{D8FB1B42-E81F-421F-9200-BB216B6B8970}" type="datetimeFigureOut">
               <a:rPr lang="en-US" smtClean="0"/>
-              <a:t>1/19/2019</a:t>
+              <a:t>1/26/2019</a:t>
             </a:fld>
             <a:endParaRPr lang="en-US"/>
           </a:p>
@@ -512,10 +513,9 @@
           <a:lstStyle/>
           <a:p>
             <a:r>
-              <a:rPr lang="en-US" smtClean="0"/>
+              <a:rPr lang="en-US"/>
               <a:t>Click to edit Master title style</a:t>
             </a:r>
-            <a:endParaRPr lang="en-US"/>
           </a:p>
         </p:txBody>
       </p:sp>
@@ -541,38 +541,37 @@
           <a:p>
             <a:pPr lvl="0"/>
             <a:r>
-              <a:rPr lang="en-US" smtClean="0"/>
+              <a:rPr lang="en-US"/>
               <a:t>Edit Master text styles</a:t>
             </a:r>
           </a:p>
           <a:p>
             <a:pPr lvl="1"/>
             <a:r>
-              <a:rPr lang="en-US" smtClean="0"/>
+              <a:rPr lang="en-US"/>
               <a:t>Second level</a:t>
             </a:r>
           </a:p>
           <a:p>
             <a:pPr lvl="2"/>
             <a:r>
-              <a:rPr lang="en-US" smtClean="0"/>
+              <a:rPr lang="en-US"/>
               <a:t>Third level</a:t>
             </a:r>
           </a:p>
           <a:p>
             <a:pPr lvl="3"/>
             <a:r>
-              <a:rPr lang="en-US" smtClean="0"/>
+              <a:rPr lang="en-US"/>
               <a:t>Fourth level</a:t>
             </a:r>
           </a:p>
           <a:p>
             <a:pPr lvl="4"/>
             <a:r>
-              <a:rPr lang="en-US" smtClean="0"/>
+              <a:rPr lang="en-US"/>
               <a:t>Fifth level</a:t>
             </a:r>
-            <a:endParaRPr lang="en-US"/>
           </a:p>
         </p:txBody>
       </p:sp>
@@ -593,7 +592,7 @@
           <a:p>
             <a:fld id="{D8FB1B42-E81F-421F-9200-BB216B6B8970}" type="datetimeFigureOut">
               <a:rPr lang="en-US" smtClean="0"/>
-              <a:t>1/19/2019</a:t>
+              <a:t>1/26/2019</a:t>
             </a:fld>
             <a:endParaRPr lang="en-US"/>
           </a:p>
@@ -687,10 +686,9 @@
           <a:lstStyle/>
           <a:p>
             <a:r>
-              <a:rPr lang="en-US" smtClean="0"/>
+              <a:rPr lang="en-US"/>
               <a:t>Click to edit Master title style</a:t>
             </a:r>
-            <a:endParaRPr lang="en-US"/>
           </a:p>
         </p:txBody>
       </p:sp>
@@ -711,38 +709,37 @@
           <a:p>
             <a:pPr lvl="0"/>
             <a:r>
-              <a:rPr lang="en-US" smtClean="0"/>
+              <a:rPr lang="en-US"/>
               <a:t>Edit Master text styles</a:t>
             </a:r>
           </a:p>
           <a:p>
             <a:pPr lvl="1"/>
             <a:r>
-              <a:rPr lang="en-US" smtClean="0"/>
+              <a:rPr lang="en-US"/>
               <a:t>Second level</a:t>
             </a:r>
           </a:p>
           <a:p>
             <a:pPr lvl="2"/>
             <a:r>
-              <a:rPr lang="en-US" smtClean="0"/>
+              <a:rPr lang="en-US"/>
               <a:t>Third level</a:t>
             </a:r>
           </a:p>
           <a:p>
             <a:pPr lvl="3"/>
             <a:r>
-              <a:rPr lang="en-US" smtClean="0"/>
+              <a:rPr lang="en-US"/>
               <a:t>Fourth level</a:t>
             </a:r>
           </a:p>
           <a:p>
             <a:pPr lvl="4"/>
             <a:r>
-              <a:rPr lang="en-US" smtClean="0"/>
+              <a:rPr lang="en-US"/>
               <a:t>Fifth level</a:t>
             </a:r>
-            <a:endParaRPr lang="en-US"/>
           </a:p>
         </p:txBody>
       </p:sp>
@@ -763,7 +760,7 @@
           <a:p>
             <a:fld id="{D8FB1B42-E81F-421F-9200-BB216B6B8970}" type="datetimeFigureOut">
               <a:rPr lang="en-US" smtClean="0"/>
-              <a:t>1/19/2019</a:t>
+              <a:t>1/26/2019</a:t>
             </a:fld>
             <a:endParaRPr lang="en-US"/>
           </a:p>
@@ -866,10 +863,9 @@
           </a:lstStyle>
           <a:p>
             <a:r>
-              <a:rPr lang="en-US" smtClean="0"/>
+              <a:rPr lang="en-US"/>
               <a:t>Click to edit Master title style</a:t>
             </a:r>
-            <a:endParaRPr lang="en-US"/>
           </a:p>
         </p:txBody>
       </p:sp>
@@ -986,7 +982,7 @@
           <a:p>
             <a:pPr lvl="0"/>
             <a:r>
-              <a:rPr lang="en-US" smtClean="0"/>
+              <a:rPr lang="en-US"/>
               <a:t>Edit Master text styles</a:t>
             </a:r>
           </a:p>
@@ -1009,7 +1005,7 @@
           <a:p>
             <a:fld id="{D8FB1B42-E81F-421F-9200-BB216B6B8970}" type="datetimeFigureOut">
               <a:rPr lang="en-US" smtClean="0"/>
-              <a:t>1/19/2019</a:t>
+              <a:t>1/26/2019</a:t>
             </a:fld>
             <a:endParaRPr lang="en-US"/>
           </a:p>
@@ -1103,10 +1099,9 @@
           <a:lstStyle/>
           <a:p>
             <a:r>
-              <a:rPr lang="en-US" smtClean="0"/>
+              <a:rPr lang="en-US"/>
               <a:t>Click to edit Master title style</a:t>
             </a:r>
-            <a:endParaRPr lang="en-US"/>
           </a:p>
         </p:txBody>
       </p:sp>
@@ -1132,38 +1127,37 @@
           <a:p>
             <a:pPr lvl="0"/>
             <a:r>
-              <a:rPr lang="en-US" smtClean="0"/>
+              <a:rPr lang="en-US"/>
               <a:t>Edit Master text styles</a:t>
             </a:r>
           </a:p>
           <a:p>
             <a:pPr lvl="1"/>
             <a:r>
-              <a:rPr lang="en-US" smtClean="0"/>
+              <a:rPr lang="en-US"/>
               <a:t>Second level</a:t>
             </a:r>
           </a:p>
           <a:p>
             <a:pPr lvl="2"/>
             <a:r>
-              <a:rPr lang="en-US" smtClean="0"/>
+              <a:rPr lang="en-US"/>
               <a:t>Third level</a:t>
             </a:r>
           </a:p>
           <a:p>
             <a:pPr lvl="3"/>
             <a:r>
-              <a:rPr lang="en-US" smtClean="0"/>
+              <a:rPr lang="en-US"/>
               <a:t>Fourth level</a:t>
             </a:r>
           </a:p>
           <a:p>
             <a:pPr lvl="4"/>
             <a:r>
-              <a:rPr lang="en-US" smtClean="0"/>
+              <a:rPr lang="en-US"/>
               <a:t>Fifth level</a:t>
             </a:r>
-            <a:endParaRPr lang="en-US"/>
           </a:p>
         </p:txBody>
       </p:sp>
@@ -1189,38 +1183,37 @@
           <a:p>
             <a:pPr lvl="0"/>
             <a:r>
-              <a:rPr lang="en-US" smtClean="0"/>
+              <a:rPr lang="en-US"/>
               <a:t>Edit Master text styles</a:t>
             </a:r>
           </a:p>
           <a:p>
             <a:pPr lvl="1"/>
             <a:r>
-              <a:rPr lang="en-US" smtClean="0"/>
+              <a:rPr lang="en-US"/>
               <a:t>Second level</a:t>
             </a:r>
           </a:p>
           <a:p>
             <a:pPr lvl="2"/>
             <a:r>
-              <a:rPr lang="en-US" smtClean="0"/>
+              <a:rPr lang="en-US"/>
               <a:t>Third level</a:t>
             </a:r>
           </a:p>
           <a:p>
             <a:pPr lvl="3"/>
             <a:r>
-              <a:rPr lang="en-US" smtClean="0"/>
+              <a:rPr lang="en-US"/>
               <a:t>Fourth level</a:t>
             </a:r>
           </a:p>
           <a:p>
             <a:pPr lvl="4"/>
             <a:r>
-              <a:rPr lang="en-US" smtClean="0"/>
+              <a:rPr lang="en-US"/>
               <a:t>Fifth level</a:t>
             </a:r>
-            <a:endParaRPr lang="en-US"/>
           </a:p>
         </p:txBody>
       </p:sp>
@@ -1241,7 +1234,7 @@
           <a:p>
             <a:fld id="{D8FB1B42-E81F-421F-9200-BB216B6B8970}" type="datetimeFigureOut">
               <a:rPr lang="en-US" smtClean="0"/>
-              <a:t>1/19/2019</a:t>
+              <a:t>1/26/2019</a:t>
             </a:fld>
             <a:endParaRPr lang="en-US"/>
           </a:p>
@@ -1340,10 +1333,9 @@
           <a:lstStyle/>
           <a:p>
             <a:r>
-              <a:rPr lang="en-US" smtClean="0"/>
+              <a:rPr lang="en-US"/>
               <a:t>Click to edit Master title style</a:t>
             </a:r>
-            <a:endParaRPr lang="en-US"/>
           </a:p>
         </p:txBody>
       </p:sp>
@@ -1406,7 +1398,7 @@
           <a:p>
             <a:pPr lvl="0"/>
             <a:r>
-              <a:rPr lang="en-US" smtClean="0"/>
+              <a:rPr lang="en-US"/>
               <a:t>Edit Master text styles</a:t>
             </a:r>
           </a:p>
@@ -1434,38 +1426,37 @@
           <a:p>
             <a:pPr lvl="0"/>
             <a:r>
-              <a:rPr lang="en-US" smtClean="0"/>
+              <a:rPr lang="en-US"/>
               <a:t>Edit Master text styles</a:t>
             </a:r>
           </a:p>
           <a:p>
             <a:pPr lvl="1"/>
             <a:r>
-              <a:rPr lang="en-US" smtClean="0"/>
+              <a:rPr lang="en-US"/>
               <a:t>Second level</a:t>
             </a:r>
           </a:p>
           <a:p>
             <a:pPr lvl="2"/>
             <a:r>
-              <a:rPr lang="en-US" smtClean="0"/>
+              <a:rPr lang="en-US"/>
               <a:t>Third level</a:t>
             </a:r>
           </a:p>
           <a:p>
             <a:pPr lvl="3"/>
             <a:r>
-              <a:rPr lang="en-US" smtClean="0"/>
+              <a:rPr lang="en-US"/>
               <a:t>Fourth level</a:t>
             </a:r>
           </a:p>
           <a:p>
             <a:pPr lvl="4"/>
             <a:r>
-              <a:rPr lang="en-US" smtClean="0"/>
+              <a:rPr lang="en-US"/>
               <a:t>Fifth level</a:t>
             </a:r>
-            <a:endParaRPr lang="en-US"/>
           </a:p>
         </p:txBody>
       </p:sp>
@@ -1528,7 +1519,7 @@
           <a:p>
             <a:pPr lvl="0"/>
             <a:r>
-              <a:rPr lang="en-US" smtClean="0"/>
+              <a:rPr lang="en-US"/>
               <a:t>Edit Master text styles</a:t>
             </a:r>
           </a:p>
@@ -1556,38 +1547,37 @@
           <a:p>
             <a:pPr lvl="0"/>
             <a:r>
-              <a:rPr lang="en-US" smtClean="0"/>
+              <a:rPr lang="en-US"/>
               <a:t>Edit Master text styles</a:t>
             </a:r>
           </a:p>
           <a:p>
             <a:pPr lvl="1"/>
             <a:r>
-              <a:rPr lang="en-US" smtClean="0"/>
+              <a:rPr lang="en-US"/>
               <a:t>Second level</a:t>
             </a:r>
           </a:p>
           <a:p>
             <a:pPr lvl="2"/>
             <a:r>
-              <a:rPr lang="en-US" smtClean="0"/>
+              <a:rPr lang="en-US"/>
               <a:t>Third level</a:t>
             </a:r>
           </a:p>
           <a:p>
             <a:pPr lvl="3"/>
             <a:r>
-              <a:rPr lang="en-US" smtClean="0"/>
+              <a:rPr lang="en-US"/>
               <a:t>Fourth level</a:t>
             </a:r>
           </a:p>
           <a:p>
             <a:pPr lvl="4"/>
             <a:r>
-              <a:rPr lang="en-US" smtClean="0"/>
+              <a:rPr lang="en-US"/>
               <a:t>Fifth level</a:t>
             </a:r>
-            <a:endParaRPr lang="en-US"/>
           </a:p>
         </p:txBody>
       </p:sp>
@@ -1608,7 +1598,7 @@
           <a:p>
             <a:fld id="{D8FB1B42-E81F-421F-9200-BB216B6B8970}" type="datetimeFigureOut">
               <a:rPr lang="en-US" smtClean="0"/>
-              <a:t>1/19/2019</a:t>
+              <a:t>1/26/2019</a:t>
             </a:fld>
             <a:endParaRPr lang="en-US"/>
           </a:p>
@@ -1702,10 +1692,9 @@
           <a:lstStyle/>
           <a:p>
             <a:r>
-              <a:rPr lang="en-US" smtClean="0"/>
+              <a:rPr lang="en-US"/>
               <a:t>Click to edit Master title style</a:t>
             </a:r>
-            <a:endParaRPr lang="en-US"/>
           </a:p>
         </p:txBody>
       </p:sp>
@@ -1726,7 +1715,7 @@
           <a:p>
             <a:fld id="{D8FB1B42-E81F-421F-9200-BB216B6B8970}" type="datetimeFigureOut">
               <a:rPr lang="en-US" smtClean="0"/>
-              <a:t>1/19/2019</a:t>
+              <a:t>1/26/2019</a:t>
             </a:fld>
             <a:endParaRPr lang="en-US"/>
           </a:p>
@@ -1821,7 +1810,7 @@
           <a:p>
             <a:fld id="{D8FB1B42-E81F-421F-9200-BB216B6B8970}" type="datetimeFigureOut">
               <a:rPr lang="en-US" smtClean="0"/>
-              <a:t>1/19/2019</a:t>
+              <a:t>1/26/2019</a:t>
             </a:fld>
             <a:endParaRPr lang="en-US"/>
           </a:p>
@@ -1924,10 +1913,9 @@
           </a:lstStyle>
           <a:p>
             <a:r>
-              <a:rPr lang="en-US" smtClean="0"/>
+              <a:rPr lang="en-US"/>
               <a:t>Click to edit Master title style</a:t>
             </a:r>
-            <a:endParaRPr lang="en-US"/>
           </a:p>
         </p:txBody>
       </p:sp>
@@ -1981,38 +1969,37 @@
           <a:p>
             <a:pPr lvl="0"/>
             <a:r>
-              <a:rPr lang="en-US" smtClean="0"/>
+              <a:rPr lang="en-US"/>
               <a:t>Edit Master text styles</a:t>
             </a:r>
           </a:p>
           <a:p>
             <a:pPr lvl="1"/>
             <a:r>
-              <a:rPr lang="en-US" smtClean="0"/>
+              <a:rPr lang="en-US"/>
               <a:t>Second level</a:t>
             </a:r>
           </a:p>
           <a:p>
             <a:pPr lvl="2"/>
             <a:r>
-              <a:rPr lang="en-US" smtClean="0"/>
+              <a:rPr lang="en-US"/>
               <a:t>Third level</a:t>
             </a:r>
           </a:p>
           <a:p>
             <a:pPr lvl="3"/>
             <a:r>
-              <a:rPr lang="en-US" smtClean="0"/>
+              <a:rPr lang="en-US"/>
               <a:t>Fourth level</a:t>
             </a:r>
           </a:p>
           <a:p>
             <a:pPr lvl="4"/>
             <a:r>
-              <a:rPr lang="en-US" smtClean="0"/>
+              <a:rPr lang="en-US"/>
               <a:t>Fifth level</a:t>
             </a:r>
-            <a:endParaRPr lang="en-US"/>
           </a:p>
         </p:txBody>
       </p:sp>
@@ -2075,7 +2062,7 @@
           <a:p>
             <a:pPr lvl="0"/>
             <a:r>
-              <a:rPr lang="en-US" smtClean="0"/>
+              <a:rPr lang="en-US"/>
               <a:t>Edit Master text styles</a:t>
             </a:r>
           </a:p>
@@ -2098,7 +2085,7 @@
           <a:p>
             <a:fld id="{D8FB1B42-E81F-421F-9200-BB216B6B8970}" type="datetimeFigureOut">
               <a:rPr lang="en-US" smtClean="0"/>
-              <a:t>1/19/2019</a:t>
+              <a:t>1/26/2019</a:t>
             </a:fld>
             <a:endParaRPr lang="en-US"/>
           </a:p>
@@ -2201,10 +2188,9 @@
           </a:lstStyle>
           <a:p>
             <a:r>
-              <a:rPr lang="en-US" smtClean="0"/>
+              <a:rPr lang="en-US"/>
               <a:t>Click to edit Master title style</a:t>
             </a:r>
-            <a:endParaRPr lang="en-US"/>
           </a:p>
         </p:txBody>
       </p:sp>
@@ -2328,7 +2314,7 @@
           <a:p>
             <a:pPr lvl="0"/>
             <a:r>
-              <a:rPr lang="en-US" smtClean="0"/>
+              <a:rPr lang="en-US"/>
               <a:t>Edit Master text styles</a:t>
             </a:r>
           </a:p>
@@ -2351,7 +2337,7 @@
           <a:p>
             <a:fld id="{D8FB1B42-E81F-421F-9200-BB216B6B8970}" type="datetimeFigureOut">
               <a:rPr lang="en-US" smtClean="0"/>
-              <a:t>1/19/2019</a:t>
+              <a:t>1/26/2019</a:t>
             </a:fld>
             <a:endParaRPr lang="en-US"/>
           </a:p>
@@ -2460,10 +2446,9 @@
           <a:lstStyle/>
           <a:p>
             <a:r>
-              <a:rPr lang="en-US" smtClean="0"/>
+              <a:rPr lang="en-US"/>
               <a:t>Click to edit Master title style</a:t>
             </a:r>
-            <a:endParaRPr lang="en-US"/>
           </a:p>
         </p:txBody>
       </p:sp>
@@ -2494,38 +2479,37 @@
           <a:p>
             <a:pPr lvl="0"/>
             <a:r>
-              <a:rPr lang="en-US" smtClean="0"/>
+              <a:rPr lang="en-US"/>
               <a:t>Edit Master text styles</a:t>
             </a:r>
           </a:p>
           <a:p>
             <a:pPr lvl="1"/>
             <a:r>
-              <a:rPr lang="en-US" smtClean="0"/>
+              <a:rPr lang="en-US"/>
               <a:t>Second level</a:t>
             </a:r>
           </a:p>
           <a:p>
             <a:pPr lvl="2"/>
             <a:r>
-              <a:rPr lang="en-US" smtClean="0"/>
+              <a:rPr lang="en-US"/>
               <a:t>Third level</a:t>
             </a:r>
           </a:p>
           <a:p>
             <a:pPr lvl="3"/>
             <a:r>
-              <a:rPr lang="en-US" smtClean="0"/>
+              <a:rPr lang="en-US"/>
               <a:t>Fourth level</a:t>
             </a:r>
           </a:p>
           <a:p>
             <a:pPr lvl="4"/>
             <a:r>
-              <a:rPr lang="en-US" smtClean="0"/>
+              <a:rPr lang="en-US"/>
               <a:t>Fifth level</a:t>
             </a:r>
-            <a:endParaRPr lang="en-US"/>
           </a:p>
         </p:txBody>
       </p:sp>
@@ -2564,7 +2548,7 @@
           <a:p>
             <a:fld id="{D8FB1B42-E81F-421F-9200-BB216B6B8970}" type="datetimeFigureOut">
               <a:rPr lang="en-US" smtClean="0"/>
-              <a:t>1/19/2019</a:t>
+              <a:t>1/26/2019</a:t>
             </a:fld>
             <a:endParaRPr lang="en-US"/>
           </a:p>
@@ -3063,25 +3047,11 @@
           <a:bodyPr rtlCol="0" anchor="ctr"/>
           <a:lstStyle/>
           <a:p>
-            <a:pPr marL="0" marR="0" lvl="0" indent="0" algn="ctr" defTabSz="914400" rtl="0" eaLnBrk="1" fontAlgn="auto" latinLnBrk="0" hangingPunct="1">
-              <a:lnSpc>
-                <a:spcPct val="100000"/>
-              </a:lnSpc>
-              <a:spcBef>
-                <a:spcPts val="0"/>
-              </a:spcBef>
-              <a:spcAft>
-                <a:spcPts val="0"/>
-              </a:spcAft>
-              <a:buClrTx/>
-              <a:buSzTx/>
-              <a:buFontTx/>
-              <a:buNone/>
-              <a:tabLst/>
+            <a:pPr lvl="2" algn="ctr">
               <a:defRPr/>
             </a:pPr>
             <a:r>
-              <a:rPr lang="en-US" sz="4800" dirty="0" smtClean="0">
+              <a:rPr lang="en-US" sz="4800" dirty="0">
                 <a:solidFill>
                   <a:prstClr val="white"/>
                 </a:solidFill>
@@ -3090,13 +3060,6 @@
               </a:rPr>
               <a:t>Handling Different Types of Exceptions</a:t>
             </a:r>
-            <a:endParaRPr lang="en-US" sz="4800" dirty="0">
-              <a:solidFill>
-                <a:prstClr val="white"/>
-              </a:solidFill>
-              <a:latin typeface="Source Sans Pro Light" panose="020B0403030403020204" pitchFamily="34" charset="0"/>
-              <a:ea typeface="Source Sans Pro Light" panose="020B0403030403020204" pitchFamily="34" charset="0"/>
-            </a:endParaRPr>
           </a:p>
         </p:txBody>
       </p:sp>
@@ -3128,7 +3091,7 @@
         </p:blipFill>
         <p:spPr>
           <a:xfrm>
-            <a:off x="1078069" y="3037198"/>
+            <a:off x="634448" y="2946952"/>
             <a:ext cx="964096" cy="964096"/>
           </a:xfrm>
           <a:prstGeom prst="rect">

</xml_diff>